<commit_message>
Update documentations under Stock category.
</commit_message>
<xml_diff>
--- a/docs/documentations/Joseph/Joseph Developer Diagram v3.0.pptx
+++ b/docs/documentations/Joseph/Joseph Developer Diagram v3.0.pptx
@@ -206,7 +206,7 @@
           <a:p>
             <a:fld id="{74451ADB-84B5-4955-A134-48E48A07CD62}" type="datetimeFigureOut">
               <a:rPr lang="en-SG" smtClean="0"/>
-              <a:t>7/4/2020</a:t>
+              <a:t>10/4/2020</a:t>
             </a:fld>
             <a:endParaRPr lang="en-SG"/>
           </a:p>
@@ -1223,7 +1223,7 @@
           <a:p>
             <a:fld id="{9897395B-2A77-4333-90BE-C3F4F6093E46}" type="datetimeFigureOut">
               <a:rPr lang="en-SG" smtClean="0"/>
-              <a:t>7/4/2020</a:t>
+              <a:t>10/4/2020</a:t>
             </a:fld>
             <a:endParaRPr lang="en-SG"/>
           </a:p>
@@ -1423,7 +1423,7 @@
           <a:p>
             <a:fld id="{9897395B-2A77-4333-90BE-C3F4F6093E46}" type="datetimeFigureOut">
               <a:rPr lang="en-SG" smtClean="0"/>
-              <a:t>7/4/2020</a:t>
+              <a:t>10/4/2020</a:t>
             </a:fld>
             <a:endParaRPr lang="en-SG"/>
           </a:p>
@@ -1633,7 +1633,7 @@
           <a:p>
             <a:fld id="{9897395B-2A77-4333-90BE-C3F4F6093E46}" type="datetimeFigureOut">
               <a:rPr lang="en-SG" smtClean="0"/>
-              <a:t>7/4/2020</a:t>
+              <a:t>10/4/2020</a:t>
             </a:fld>
             <a:endParaRPr lang="en-SG"/>
           </a:p>
@@ -1833,7 +1833,7 @@
           <a:p>
             <a:fld id="{9897395B-2A77-4333-90BE-C3F4F6093E46}" type="datetimeFigureOut">
               <a:rPr lang="en-SG" smtClean="0"/>
-              <a:t>7/4/2020</a:t>
+              <a:t>10/4/2020</a:t>
             </a:fld>
             <a:endParaRPr lang="en-SG"/>
           </a:p>
@@ -2109,7 +2109,7 @@
           <a:p>
             <a:fld id="{9897395B-2A77-4333-90BE-C3F4F6093E46}" type="datetimeFigureOut">
               <a:rPr lang="en-SG" smtClean="0"/>
-              <a:t>7/4/2020</a:t>
+              <a:t>10/4/2020</a:t>
             </a:fld>
             <a:endParaRPr lang="en-SG"/>
           </a:p>
@@ -2377,7 +2377,7 @@
           <a:p>
             <a:fld id="{9897395B-2A77-4333-90BE-C3F4F6093E46}" type="datetimeFigureOut">
               <a:rPr lang="en-SG" smtClean="0"/>
-              <a:t>7/4/2020</a:t>
+              <a:t>10/4/2020</a:t>
             </a:fld>
             <a:endParaRPr lang="en-SG"/>
           </a:p>
@@ -2792,7 +2792,7 @@
           <a:p>
             <a:fld id="{9897395B-2A77-4333-90BE-C3F4F6093E46}" type="datetimeFigureOut">
               <a:rPr lang="en-SG" smtClean="0"/>
-              <a:t>7/4/2020</a:t>
+              <a:t>10/4/2020</a:t>
             </a:fld>
             <a:endParaRPr lang="en-SG"/>
           </a:p>
@@ -2934,7 +2934,7 @@
           <a:p>
             <a:fld id="{9897395B-2A77-4333-90BE-C3F4F6093E46}" type="datetimeFigureOut">
               <a:rPr lang="en-SG" smtClean="0"/>
-              <a:t>7/4/2020</a:t>
+              <a:t>10/4/2020</a:t>
             </a:fld>
             <a:endParaRPr lang="en-SG"/>
           </a:p>
@@ -3047,7 +3047,7 @@
           <a:p>
             <a:fld id="{9897395B-2A77-4333-90BE-C3F4F6093E46}" type="datetimeFigureOut">
               <a:rPr lang="en-SG" smtClean="0"/>
-              <a:t>7/4/2020</a:t>
+              <a:t>10/4/2020</a:t>
             </a:fld>
             <a:endParaRPr lang="en-SG"/>
           </a:p>
@@ -3360,7 +3360,7 @@
           <a:p>
             <a:fld id="{9897395B-2A77-4333-90BE-C3F4F6093E46}" type="datetimeFigureOut">
               <a:rPr lang="en-SG" smtClean="0"/>
-              <a:t>7/4/2020</a:t>
+              <a:t>10/4/2020</a:t>
             </a:fld>
             <a:endParaRPr lang="en-SG"/>
           </a:p>
@@ -3649,7 +3649,7 @@
           <a:p>
             <a:fld id="{9897395B-2A77-4333-90BE-C3F4F6093E46}" type="datetimeFigureOut">
               <a:rPr lang="en-SG" smtClean="0"/>
-              <a:t>7/4/2020</a:t>
+              <a:t>10/4/2020</a:t>
             </a:fld>
             <a:endParaRPr lang="en-SG"/>
           </a:p>
@@ -3892,7 +3892,7 @@
           <a:p>
             <a:fld id="{9897395B-2A77-4333-90BE-C3F4F6093E46}" type="datetimeFigureOut">
               <a:rPr lang="en-SG" smtClean="0"/>
-              <a:t>7/4/2020</a:t>
+              <a:t>10/4/2020</a:t>
             </a:fld>
             <a:endParaRPr lang="en-SG"/>
           </a:p>
@@ -6081,6 +6081,49 @@
           <a:chExt cx="0" cy="0"/>
         </a:xfrm>
       </p:grpSpPr>
+      <p:cxnSp>
+        <p:nvCxnSpPr>
+          <p:cNvPr id="28" name="Straight Connector 27">
+            <a:extLst>
+              <a:ext uri="{FF2B5EF4-FFF2-40B4-BE49-F238E27FC236}">
+                <a16:creationId xmlns:a16="http://schemas.microsoft.com/office/drawing/2014/main" id="{6F3B2A8E-28B9-43D3-AD6E-2BBF240436CE}"/>
+              </a:ext>
+            </a:extLst>
+          </p:cNvPr>
+          <p:cNvCxnSpPr>
+            <a:cxnSpLocks/>
+          </p:cNvCxnSpPr>
+          <p:nvPr/>
+        </p:nvCxnSpPr>
+        <p:spPr>
+          <a:xfrm>
+            <a:off x="2350956" y="4891437"/>
+            <a:ext cx="0" cy="293954"/>
+          </a:xfrm>
+          <a:prstGeom prst="line">
+            <a:avLst/>
+          </a:prstGeom>
+          <a:ln w="28575">
+            <a:solidFill>
+              <a:srgbClr val="FF0000"/>
+            </a:solidFill>
+          </a:ln>
+        </p:spPr>
+        <p:style>
+          <a:lnRef idx="1">
+            <a:schemeClr val="accent2"/>
+          </a:lnRef>
+          <a:fillRef idx="0">
+            <a:schemeClr val="accent2"/>
+          </a:fillRef>
+          <a:effectRef idx="0">
+            <a:schemeClr val="accent2"/>
+          </a:effectRef>
+          <a:fontRef idx="minor">
+            <a:schemeClr val="tx1"/>
+          </a:fontRef>
+        </p:style>
+      </p:cxnSp>
       <p:sp>
         <p:nvSpPr>
           <p:cNvPr id="4" name="Rectangle 3">
@@ -6095,7 +6138,7 @@
         </p:nvSpPr>
         <p:spPr>
           <a:xfrm>
-            <a:off x="5181052" y="62585"/>
+            <a:off x="4158587" y="64299"/>
             <a:ext cx="1872106" cy="400110"/>
           </a:xfrm>
           <a:prstGeom prst="rect">
@@ -6151,7 +6194,7 @@
         </p:nvSpPr>
         <p:spPr>
           <a:xfrm>
-            <a:off x="7560685" y="1532110"/>
+            <a:off x="6538826" y="1351834"/>
             <a:ext cx="2667000" cy="400110"/>
           </a:xfrm>
           <a:prstGeom prst="rect">
@@ -6207,7 +6250,7 @@
         </p:nvSpPr>
         <p:spPr>
           <a:xfrm>
-            <a:off x="8891141" y="1245980"/>
+            <a:off x="7872326" y="1049586"/>
             <a:ext cx="609600" cy="307777"/>
           </a:xfrm>
           <a:prstGeom prst="rect">
@@ -6248,7 +6291,7 @@
         </p:nvSpPr>
         <p:spPr>
           <a:xfrm>
-            <a:off x="8668594" y="1244478"/>
+            <a:off x="7597672" y="1069825"/>
             <a:ext cx="609600" cy="307777"/>
           </a:xfrm>
           <a:prstGeom prst="rect">
@@ -6289,7 +6332,7 @@
         </p:nvSpPr>
         <p:spPr>
           <a:xfrm>
-            <a:off x="1824004" y="1794658"/>
+            <a:off x="801539" y="1796372"/>
             <a:ext cx="3188969" cy="400110"/>
           </a:xfrm>
           <a:prstGeom prst="rect">
@@ -6374,7 +6417,7 @@
         </p:nvSpPr>
         <p:spPr>
           <a:xfrm>
-            <a:off x="1823241" y="2193859"/>
+            <a:off x="800776" y="2195573"/>
             <a:ext cx="3188969" cy="784830"/>
           </a:xfrm>
           <a:prstGeom prst="rect">
@@ -6573,7 +6616,7 @@
         </p:nvSpPr>
         <p:spPr>
           <a:xfrm>
-            <a:off x="2122971" y="3175933"/>
+            <a:off x="1099412" y="3308650"/>
             <a:ext cx="2798064" cy="400110"/>
           </a:xfrm>
           <a:prstGeom prst="rect">
@@ -6634,7 +6677,7 @@
         </p:nvSpPr>
         <p:spPr>
           <a:xfrm>
-            <a:off x="2099607" y="5052468"/>
+            <a:off x="1077142" y="5054182"/>
             <a:ext cx="2778369" cy="400110"/>
           </a:xfrm>
           <a:prstGeom prst="rect">
@@ -6695,7 +6738,7 @@
         </p:nvSpPr>
         <p:spPr>
           <a:xfrm>
-            <a:off x="3260192" y="4737323"/>
+            <a:off x="2237727" y="4739037"/>
             <a:ext cx="228600" cy="152400"/>
           </a:xfrm>
           <a:prstGeom prst="triangle">
@@ -6739,49 +6782,6 @@
           </a:p>
         </p:txBody>
       </p:sp>
-      <p:cxnSp>
-        <p:nvCxnSpPr>
-          <p:cNvPr id="28" name="Straight Connector 27">
-            <a:extLst>
-              <a:ext uri="{FF2B5EF4-FFF2-40B4-BE49-F238E27FC236}">
-                <a16:creationId xmlns:a16="http://schemas.microsoft.com/office/drawing/2014/main" id="{6F3B2A8E-28B9-43D3-AD6E-2BBF240436CE}"/>
-              </a:ext>
-            </a:extLst>
-          </p:cNvPr>
-          <p:cNvCxnSpPr>
-            <a:cxnSpLocks/>
-          </p:cNvCxnSpPr>
-          <p:nvPr/>
-        </p:nvCxnSpPr>
-        <p:spPr>
-          <a:xfrm>
-            <a:off x="3373421" y="4889723"/>
-            <a:ext cx="0" cy="293954"/>
-          </a:xfrm>
-          <a:prstGeom prst="line">
-            <a:avLst/>
-          </a:prstGeom>
-          <a:ln w="28575">
-            <a:solidFill>
-              <a:srgbClr val="FF0000"/>
-            </a:solidFill>
-          </a:ln>
-        </p:spPr>
-        <p:style>
-          <a:lnRef idx="1">
-            <a:schemeClr val="accent2"/>
-          </a:lnRef>
-          <a:fillRef idx="0">
-            <a:schemeClr val="accent2"/>
-          </a:fillRef>
-          <a:effectRef idx="0">
-            <a:schemeClr val="accent2"/>
-          </a:effectRef>
-          <a:fontRef idx="minor">
-            <a:schemeClr val="tx1"/>
-          </a:fontRef>
-        </p:style>
-      </p:cxnSp>
       <p:sp>
         <p:nvSpPr>
           <p:cNvPr id="54" name="Rectangle 53">
@@ -6796,7 +6796,7 @@
         </p:nvSpPr>
         <p:spPr>
           <a:xfrm>
-            <a:off x="7560685" y="1920161"/>
+            <a:off x="6537701" y="1772183"/>
             <a:ext cx="2667000" cy="507831"/>
           </a:xfrm>
           <a:prstGeom prst="rect">
@@ -6858,7 +6858,7 @@
                   <a:sysClr val="windowText" lastClr="000000"/>
                 </a:solidFill>
               </a:rPr>
-              <a:t>: Set&lt;String&gt; </a:t>
+              <a:t>: Set&lt;String&gt;</a:t>
             </a:r>
           </a:p>
           <a:p>
@@ -6873,7 +6873,7 @@
                   <a:sysClr val="windowText" lastClr="000000"/>
                 </a:solidFill>
               </a:rPr>
-              <a:t>lineSeperator</a:t>
+              <a:t>lineSeparator</a:t>
             </a:r>
             <a:r>
               <a:rPr lang="en-US" sz="900" kern="0" dirty="0">
@@ -6900,8 +6900,8 @@
         </p:nvSpPr>
         <p:spPr>
           <a:xfrm>
-            <a:off x="7561898" y="2439125"/>
-            <a:ext cx="2665787" cy="1738938"/>
+            <a:off x="6538914" y="2282429"/>
+            <a:ext cx="2665787" cy="2031325"/>
           </a:xfrm>
           <a:prstGeom prst="rect">
             <a:avLst/>
@@ -7271,6 +7271,56 @@
             </a:r>
           </a:p>
           <a:p>
+            <a:pPr>
+              <a:defRPr/>
+            </a:pPr>
+            <a:r>
+              <a:rPr lang="en-US" sz="900" kern="0" dirty="0">
+                <a:solidFill>
+                  <a:sysClr val="windowText" lastClr="000000"/>
+                </a:solidFill>
+              </a:rPr>
+              <a:t>- </a:t>
+            </a:r>
+            <a:r>
+              <a:rPr lang="en-US" sz="900" kern="0" dirty="0" err="1">
+                <a:solidFill>
+                  <a:sysClr val="windowText" lastClr="000000"/>
+                </a:solidFill>
+              </a:rPr>
+              <a:t>printDuplicateIngredientMessage</a:t>
+            </a:r>
+            <a:r>
+              <a:rPr lang="en-US" sz="900" kern="0" dirty="0">
+                <a:solidFill>
+                  <a:sysClr val="windowText" lastClr="000000"/>
+                </a:solidFill>
+              </a:rPr>
+              <a:t>(</a:t>
+            </a:r>
+          </a:p>
+          <a:p>
+            <a:pPr>
+              <a:defRPr/>
+            </a:pPr>
+            <a:r>
+              <a:rPr lang="en-US" sz="900" kern="0" dirty="0" err="1">
+                <a:solidFill>
+                  <a:sysClr val="windowText" lastClr="000000"/>
+                </a:solidFill>
+              </a:rPr>
+              <a:t>ingredientNameToCheck</a:t>
+            </a:r>
+            <a:r>
+              <a:rPr lang="en-US" sz="900" kern="0" dirty="0">
+                <a:solidFill>
+                  <a:sysClr val="windowText" lastClr="000000"/>
+                </a:solidFill>
+              </a:rPr>
+              <a:t>, String)</a:t>
+            </a:r>
+          </a:p>
+          <a:p>
             <a:pPr marL="171450" indent="-171450">
               <a:buFontTx/>
               <a:buChar char="-"/>
@@ -7298,8 +7348,8 @@
         </p:nvSpPr>
         <p:spPr>
           <a:xfrm>
-            <a:off x="2122971" y="3588727"/>
-            <a:ext cx="2798064" cy="369332"/>
+            <a:off x="1100079" y="3720778"/>
+            <a:ext cx="2798064" cy="230832"/>
           </a:xfrm>
           <a:prstGeom prst="rect">
             <a:avLst/>
@@ -7354,35 +7404,6 @@
               <a:t>: Integer</a:t>
             </a:r>
           </a:p>
-          <a:p>
-            <a:pPr>
-              <a:defRPr/>
-            </a:pPr>
-            <a:r>
-              <a:rPr lang="en-US" sz="900" kern="0" dirty="0">
-                <a:solidFill>
-                  <a:sysClr val="windowText" lastClr="000000"/>
-                </a:solidFill>
-              </a:rPr>
-              <a:t># </a:t>
-            </a:r>
-            <a:r>
-              <a:rPr lang="en-US" sz="900" kern="0" dirty="0" err="1">
-                <a:solidFill>
-                  <a:sysClr val="windowText" lastClr="000000"/>
-                </a:solidFill>
-              </a:rPr>
-              <a:t>indexAfterDollarSign</a:t>
-            </a:r>
-            <a:r>
-              <a:rPr lang="en-US" sz="900" kern="0" dirty="0">
-                <a:solidFill>
-                  <a:sysClr val="windowText" lastClr="000000"/>
-                </a:solidFill>
-              </a:rPr>
-              <a:t>: Integer</a:t>
-            </a:r>
-          </a:p>
         </p:txBody>
       </p:sp>
       <p:sp>
@@ -7399,7 +7420,7 @@
         </p:nvSpPr>
         <p:spPr>
           <a:xfrm>
-            <a:off x="2121877" y="3958059"/>
+            <a:off x="1099412" y="3959773"/>
             <a:ext cx="2795377" cy="784830"/>
           </a:xfrm>
           <a:prstGeom prst="rect">
@@ -7605,7 +7626,7 @@
         </p:nvSpPr>
         <p:spPr bwMode="auto">
           <a:xfrm>
-            <a:off x="6145884" y="4487729"/>
+            <a:off x="5156167" y="4670822"/>
             <a:ext cx="2830057" cy="400110"/>
           </a:xfrm>
           <a:prstGeom prst="rect">
@@ -7662,7 +7683,7 @@
         </p:nvSpPr>
         <p:spPr bwMode="auto">
           <a:xfrm>
-            <a:off x="6155133" y="4898972"/>
+            <a:off x="5165416" y="5082065"/>
             <a:ext cx="2820808" cy="575888"/>
           </a:xfrm>
           <a:prstGeom prst="rect">
@@ -7741,7 +7762,7 @@
         </p:nvSpPr>
         <p:spPr bwMode="auto">
           <a:xfrm>
-            <a:off x="6155134" y="5486535"/>
+            <a:off x="5165417" y="5669628"/>
             <a:ext cx="2820807" cy="1013657"/>
           </a:xfrm>
           <a:prstGeom prst="rect">
@@ -7946,12 +7967,12 @@
         </p:nvCxnSpPr>
         <p:spPr>
           <a:xfrm flipH="1">
-            <a:off x="8975941" y="3308594"/>
-            <a:ext cx="1251744" cy="1379190"/>
+            <a:off x="7986224" y="3298092"/>
+            <a:ext cx="1218477" cy="1572785"/>
           </a:xfrm>
           <a:prstGeom prst="bentConnector3">
             <a:avLst>
-              <a:gd name="adj1" fmla="val -18263"/>
+              <a:gd name="adj1" fmla="val -18761"/>
             </a:avLst>
           </a:prstGeom>
           <a:ln>
@@ -7991,7 +8012,7 @@
         </p:nvSpPr>
         <p:spPr>
           <a:xfrm>
-            <a:off x="7124419" y="2216612"/>
+            <a:off x="6101954" y="2218326"/>
             <a:ext cx="609600" cy="307777"/>
           </a:xfrm>
           <a:prstGeom prst="rect">
@@ -8032,7 +8053,7 @@
         </p:nvSpPr>
         <p:spPr>
           <a:xfrm>
-            <a:off x="6909294" y="1999692"/>
+            <a:off x="5886829" y="2001406"/>
             <a:ext cx="609600" cy="307777"/>
           </a:xfrm>
           <a:prstGeom prst="rect">
@@ -8073,7 +8094,7 @@
         </p:nvSpPr>
         <p:spPr>
           <a:xfrm>
-            <a:off x="7246304" y="3288355"/>
+            <a:off x="6223839" y="3290069"/>
             <a:ext cx="609600" cy="307777"/>
           </a:xfrm>
           <a:prstGeom prst="rect">
@@ -8114,7 +8135,7 @@
         </p:nvSpPr>
         <p:spPr>
           <a:xfrm>
-            <a:off x="4894660" y="5734712"/>
+            <a:off x="3872195" y="5736426"/>
             <a:ext cx="171830" cy="215434"/>
           </a:xfrm>
           <a:prstGeom prst="diamond">
@@ -8163,7 +8184,7 @@
         </p:nvSpPr>
         <p:spPr>
           <a:xfrm>
-            <a:off x="1851295" y="5380633"/>
+            <a:off x="828830" y="5382347"/>
             <a:ext cx="609600" cy="307777"/>
           </a:xfrm>
           <a:prstGeom prst="rect">
@@ -8204,7 +8225,7 @@
         </p:nvSpPr>
         <p:spPr>
           <a:xfrm>
-            <a:off x="7365082" y="2145413"/>
+            <a:off x="6342617" y="2147127"/>
             <a:ext cx="171830" cy="215434"/>
           </a:xfrm>
           <a:prstGeom prst="diamond">
@@ -8253,7 +8274,7 @@
         </p:nvCxnSpPr>
         <p:spPr>
           <a:xfrm>
-            <a:off x="5012972" y="1994714"/>
+            <a:off x="3990507" y="1996428"/>
             <a:ext cx="2352110" cy="258417"/>
           </a:xfrm>
           <a:prstGeom prst="bentConnector3">
@@ -8294,7 +8315,7 @@
         </p:nvSpPr>
         <p:spPr>
           <a:xfrm>
-            <a:off x="7086879" y="265603"/>
+            <a:off x="6064414" y="267317"/>
             <a:ext cx="171830" cy="215434"/>
           </a:xfrm>
           <a:prstGeom prst="diamond">
@@ -8337,15 +8358,14 @@
             </a:extLst>
           </p:cNvPr>
           <p:cNvCxnSpPr>
-            <a:stCxn id="148" idx="3"/>
-            <a:endCxn id="5" idx="0"/>
+            <a:cxnSpLocks/>
           </p:cNvCxnSpPr>
           <p:nvPr/>
         </p:nvCxnSpPr>
         <p:spPr>
           <a:xfrm>
-            <a:off x="7258709" y="373320"/>
-            <a:ext cx="1635476" cy="1158790"/>
+            <a:off x="6236244" y="369468"/>
+            <a:ext cx="1636082" cy="976800"/>
           </a:xfrm>
           <a:prstGeom prst="bentConnector2">
             <a:avLst/>
@@ -8380,7 +8400,7 @@
         </p:nvSpPr>
         <p:spPr>
           <a:xfrm>
-            <a:off x="7061339" y="2978772"/>
+            <a:off x="6038874" y="2980486"/>
             <a:ext cx="609600" cy="307777"/>
           </a:xfrm>
           <a:prstGeom prst="rect">
@@ -8423,7 +8443,7 @@
         </p:nvSpPr>
         <p:spPr bwMode="auto">
           <a:xfrm>
-            <a:off x="1642301" y="117520"/>
+            <a:off x="619836" y="119234"/>
             <a:ext cx="2303702" cy="307777"/>
           </a:xfrm>
           <a:prstGeom prst="rect">
@@ -8478,7 +8498,7 @@
         </p:nvSpPr>
         <p:spPr>
           <a:xfrm>
-            <a:off x="4975501" y="170378"/>
+            <a:off x="3953036" y="172092"/>
             <a:ext cx="171830" cy="215434"/>
           </a:xfrm>
           <a:prstGeom prst="diamond">
@@ -8527,7 +8547,7 @@
         </p:nvSpPr>
         <p:spPr bwMode="auto">
           <a:xfrm>
-            <a:off x="1642255" y="428632"/>
+            <a:off x="619790" y="430346"/>
             <a:ext cx="2303703" cy="438702"/>
           </a:xfrm>
           <a:prstGeom prst="rect">
@@ -8635,7 +8655,7 @@
         </p:nvSpPr>
         <p:spPr bwMode="auto">
           <a:xfrm>
-            <a:off x="1636310" y="876160"/>
+            <a:off x="613845" y="877874"/>
             <a:ext cx="2309695" cy="686738"/>
           </a:xfrm>
           <a:prstGeom prst="rect">
@@ -8807,7 +8827,7 @@
         </p:nvCxnSpPr>
         <p:spPr>
           <a:xfrm>
-            <a:off x="3946003" y="271409"/>
+            <a:off x="2923538" y="273123"/>
             <a:ext cx="1029498" cy="6687"/>
           </a:xfrm>
           <a:prstGeom prst="bentConnector3">
@@ -8845,7 +8865,7 @@
         </p:nvCxnSpPr>
         <p:spPr>
           <a:xfrm rot="10800000" flipV="1">
-            <a:off x="4139361" y="1381857"/>
+            <a:off x="3116896" y="1383571"/>
             <a:ext cx="1762564" cy="403097"/>
           </a:xfrm>
           <a:prstGeom prst="bentConnector2">
@@ -8885,7 +8905,7 @@
         </p:nvSpPr>
         <p:spPr>
           <a:xfrm>
-            <a:off x="3945241" y="265604"/>
+            <a:off x="2922776" y="267318"/>
             <a:ext cx="609600" cy="307777"/>
           </a:xfrm>
           <a:prstGeom prst="rect">
@@ -8926,7 +8946,7 @@
         </p:nvSpPr>
         <p:spPr>
           <a:xfrm>
-            <a:off x="3944136" y="-1714"/>
+            <a:off x="2921671" y="0"/>
             <a:ext cx="609600" cy="307777"/>
           </a:xfrm>
           <a:prstGeom prst="rect">
@@ -8974,7 +8994,7 @@
         </p:nvSpPr>
         <p:spPr>
           <a:xfrm>
-            <a:off x="5184494" y="474051"/>
+            <a:off x="4162029" y="475765"/>
             <a:ext cx="1875147" cy="507831"/>
           </a:xfrm>
           <a:prstGeom prst="rect">
@@ -9075,7 +9095,7 @@
         </p:nvSpPr>
         <p:spPr>
           <a:xfrm>
-            <a:off x="5181052" y="999146"/>
+            <a:off x="4158587" y="1000860"/>
             <a:ext cx="1884300" cy="784830"/>
           </a:xfrm>
           <a:prstGeom prst="rect">
@@ -9247,7 +9267,7 @@
         </p:nvSpPr>
         <p:spPr>
           <a:xfrm>
-            <a:off x="2105512" y="5978516"/>
+            <a:off x="1083047" y="5980230"/>
             <a:ext cx="2772464" cy="784830"/>
           </a:xfrm>
           <a:prstGeom prst="rect">
@@ -9451,7 +9471,7 @@
         </p:nvSpPr>
         <p:spPr>
           <a:xfrm>
-            <a:off x="2099607" y="5464596"/>
+            <a:off x="1077142" y="5466310"/>
             <a:ext cx="2778369" cy="507831"/>
           </a:xfrm>
           <a:prstGeom prst="rect">
@@ -9567,7 +9587,7 @@
         </p:nvCxnSpPr>
         <p:spPr>
           <a:xfrm flipV="1">
-            <a:off x="5076036" y="3308594"/>
+            <a:off x="4053571" y="3310308"/>
             <a:ext cx="2484130" cy="2533835"/>
           </a:xfrm>
           <a:prstGeom prst="bentConnector3">
@@ -9613,7 +9633,7 @@
         </p:nvCxnSpPr>
         <p:spPr>
           <a:xfrm rot="10800000" flipH="1" flipV="1">
-            <a:off x="1823241" y="2586273"/>
+            <a:off x="800776" y="2587987"/>
             <a:ext cx="276366" cy="2666249"/>
           </a:xfrm>
           <a:prstGeom prst="bentConnector3">
@@ -9658,7 +9678,7 @@
         </p:nvSpPr>
         <p:spPr>
           <a:xfrm>
-            <a:off x="1590306" y="2303273"/>
+            <a:off x="567841" y="2304987"/>
             <a:ext cx="609600" cy="307777"/>
           </a:xfrm>
           <a:prstGeom prst="rect">
@@ -9699,7 +9719,7 @@
         </p:nvSpPr>
         <p:spPr>
           <a:xfrm>
-            <a:off x="4115664" y="1437430"/>
+            <a:off x="3093199" y="1439144"/>
             <a:ext cx="609600" cy="307777"/>
           </a:xfrm>
           <a:prstGeom prst="rect">
@@ -9740,7 +9760,7 @@
         </p:nvSpPr>
         <p:spPr>
           <a:xfrm>
-            <a:off x="9027298" y="4665597"/>
+            <a:off x="7954339" y="4833389"/>
             <a:ext cx="609600" cy="307777"/>
           </a:xfrm>
           <a:prstGeom prst="rect">
@@ -9781,7 +9801,7 @@
         </p:nvSpPr>
         <p:spPr>
           <a:xfrm>
-            <a:off x="8937048" y="4238965"/>
+            <a:off x="7986224" y="4439990"/>
             <a:ext cx="2285357" cy="430887"/>
           </a:xfrm>
           <a:prstGeom prst="rect">
@@ -9834,6 +9854,793 @@
                 </a:schemeClr>
               </a:solidFill>
             </a:endParaRPr>
+          </a:p>
+        </p:txBody>
+      </p:sp>
+      <p:sp>
+        <p:nvSpPr>
+          <p:cNvPr id="56" name="Rectangle 5">
+            <a:extLst>
+              <a:ext uri="{FF2B5EF4-FFF2-40B4-BE49-F238E27FC236}">
+                <a16:creationId xmlns:a16="http://schemas.microsoft.com/office/drawing/2014/main" id="{BB27ACAA-A628-45EF-8A09-4379DF1DC93D}"/>
+              </a:ext>
+            </a:extLst>
+          </p:cNvPr>
+          <p:cNvSpPr>
+            <a:spLocks noChangeArrowheads="1"/>
+          </p:cNvSpPr>
+          <p:nvPr/>
+        </p:nvSpPr>
+        <p:spPr bwMode="auto">
+          <a:xfrm>
+            <a:off x="9526377" y="693083"/>
+            <a:ext cx="2303702" cy="307777"/>
+          </a:xfrm>
+          <a:prstGeom prst="rect">
+            <a:avLst/>
+          </a:prstGeom>
+          <a:ln w="19050">
+            <a:headEnd/>
+            <a:tailEnd type="none" w="lg" len="lg"/>
+          </a:ln>
+        </p:spPr>
+        <p:style>
+          <a:lnRef idx="1">
+            <a:schemeClr val="accent5"/>
+          </a:lnRef>
+          <a:fillRef idx="2">
+            <a:schemeClr val="accent5"/>
+          </a:fillRef>
+          <a:effectRef idx="1">
+            <a:schemeClr val="accent5"/>
+          </a:effectRef>
+          <a:fontRef idx="minor">
+            <a:schemeClr val="dk1"/>
+          </a:fontRef>
+        </p:style>
+        <p:txBody>
+          <a:bodyPr wrap="none" anchor="ctr"/>
+          <a:lstStyle/>
+          <a:p>
+            <a:pPr algn="ctr" defTabSz="872733"/>
+            <a:r>
+              <a:rPr lang="en-US" sz="2000" dirty="0" err="1">
+                <a:solidFill>
+                  <a:prstClr val="black"/>
+                </a:solidFill>
+              </a:rPr>
+              <a:t>LoadStock</a:t>
+            </a:r>
+            <a:endParaRPr lang="en-US" sz="2000" dirty="0">
+              <a:solidFill>
+                <a:prstClr val="black"/>
+              </a:solidFill>
+            </a:endParaRPr>
+          </a:p>
+        </p:txBody>
+      </p:sp>
+      <p:sp>
+        <p:nvSpPr>
+          <p:cNvPr id="57" name="Rectangle 5">
+            <a:extLst>
+              <a:ext uri="{FF2B5EF4-FFF2-40B4-BE49-F238E27FC236}">
+                <a16:creationId xmlns:a16="http://schemas.microsoft.com/office/drawing/2014/main" id="{C20E16CA-FCF7-4061-84F3-F4BA06513564}"/>
+              </a:ext>
+            </a:extLst>
+          </p:cNvPr>
+          <p:cNvSpPr>
+            <a:spLocks noChangeArrowheads="1"/>
+          </p:cNvSpPr>
+          <p:nvPr/>
+        </p:nvSpPr>
+        <p:spPr bwMode="auto">
+          <a:xfrm>
+            <a:off x="9526331" y="1004195"/>
+            <a:ext cx="2303703" cy="438702"/>
+          </a:xfrm>
+          <a:prstGeom prst="rect">
+            <a:avLst/>
+          </a:prstGeom>
+          <a:ln w="19050">
+            <a:headEnd/>
+            <a:tailEnd type="none" w="lg" len="lg"/>
+          </a:ln>
+        </p:spPr>
+        <p:style>
+          <a:lnRef idx="1">
+            <a:schemeClr val="accent5"/>
+          </a:lnRef>
+          <a:fillRef idx="2">
+            <a:schemeClr val="accent5"/>
+          </a:fillRef>
+          <a:effectRef idx="1">
+            <a:schemeClr val="accent5"/>
+          </a:effectRef>
+          <a:fontRef idx="minor">
+            <a:schemeClr val="dk1"/>
+          </a:fontRef>
+        </p:style>
+        <p:txBody>
+          <a:bodyPr wrap="none" anchor="ctr"/>
+          <a:lstStyle/>
+          <a:p>
+            <a:pPr defTabSz="872733"/>
+            <a:r>
+              <a:rPr lang="en-US" sz="900" dirty="0">
+                <a:solidFill>
+                  <a:prstClr val="black"/>
+                </a:solidFill>
+              </a:rPr>
+              <a:t>+ </a:t>
+            </a:r>
+            <a:r>
+              <a:rPr lang="en-US" sz="900" dirty="0" err="1">
+                <a:solidFill>
+                  <a:prstClr val="black"/>
+                </a:solidFill>
+              </a:rPr>
+              <a:t>DEFAULT_STORAGE_FILEPATH:String</a:t>
+            </a:r>
+            <a:endParaRPr lang="en-US" sz="900" dirty="0">
+              <a:solidFill>
+                <a:prstClr val="black"/>
+              </a:solidFill>
+            </a:endParaRPr>
+          </a:p>
+          <a:p>
+            <a:pPr defTabSz="872733"/>
+            <a:r>
+              <a:rPr lang="en-US" sz="900" dirty="0">
+                <a:solidFill>
+                  <a:prstClr val="black"/>
+                </a:solidFill>
+              </a:rPr>
+              <a:t>- </a:t>
+            </a:r>
+            <a:r>
+              <a:rPr lang="en-US" sz="900" dirty="0" err="1">
+                <a:solidFill>
+                  <a:prstClr val="black"/>
+                </a:solidFill>
+              </a:rPr>
+              <a:t>startIndexToDecodeForPrice:Double</a:t>
+            </a:r>
+            <a:endParaRPr lang="en-US" sz="900" dirty="0">
+              <a:solidFill>
+                <a:prstClr val="black"/>
+              </a:solidFill>
+            </a:endParaRPr>
+          </a:p>
+          <a:p>
+            <a:pPr defTabSz="872733"/>
+            <a:r>
+              <a:rPr lang="en-US" sz="900" dirty="0">
+                <a:solidFill>
+                  <a:prstClr val="black"/>
+                </a:solidFill>
+              </a:rPr>
+              <a:t>- </a:t>
+            </a:r>
+            <a:r>
+              <a:rPr lang="en-US" sz="900" dirty="0" err="1">
+                <a:solidFill>
+                  <a:prstClr val="black"/>
+                </a:solidFill>
+              </a:rPr>
+              <a:t>startIndexToDecodeForQuantity:Integer</a:t>
+            </a:r>
+            <a:endParaRPr lang="en-US" sz="900" dirty="0">
+              <a:solidFill>
+                <a:prstClr val="black"/>
+              </a:solidFill>
+            </a:endParaRPr>
+          </a:p>
+        </p:txBody>
+      </p:sp>
+      <p:sp>
+        <p:nvSpPr>
+          <p:cNvPr id="58" name="Rectangle 5">
+            <a:extLst>
+              <a:ext uri="{FF2B5EF4-FFF2-40B4-BE49-F238E27FC236}">
+                <a16:creationId xmlns:a16="http://schemas.microsoft.com/office/drawing/2014/main" id="{8A8485F0-E341-4084-B449-F3F3BC6B2125}"/>
+              </a:ext>
+            </a:extLst>
+          </p:cNvPr>
+          <p:cNvSpPr>
+            <a:spLocks noChangeArrowheads="1"/>
+          </p:cNvSpPr>
+          <p:nvPr/>
+        </p:nvSpPr>
+        <p:spPr bwMode="auto">
+          <a:xfrm>
+            <a:off x="9527902" y="1439144"/>
+            <a:ext cx="2309695" cy="1982768"/>
+          </a:xfrm>
+          <a:prstGeom prst="rect">
+            <a:avLst/>
+          </a:prstGeom>
+          <a:ln w="19050">
+            <a:headEnd/>
+            <a:tailEnd type="none" w="lg" len="lg"/>
+          </a:ln>
+        </p:spPr>
+        <p:style>
+          <a:lnRef idx="1">
+            <a:schemeClr val="accent5"/>
+          </a:lnRef>
+          <a:fillRef idx="2">
+            <a:schemeClr val="accent5"/>
+          </a:fillRef>
+          <a:effectRef idx="1">
+            <a:schemeClr val="accent5"/>
+          </a:effectRef>
+          <a:fontRef idx="minor">
+            <a:schemeClr val="dk1"/>
+          </a:fontRef>
+        </p:style>
+        <p:txBody>
+          <a:bodyPr wrap="none" anchor="ctr"/>
+          <a:lstStyle/>
+          <a:p>
+            <a:pPr defTabSz="872733"/>
+            <a:r>
+              <a:rPr lang="en-US" sz="900" dirty="0">
+                <a:solidFill>
+                  <a:prstClr val="black"/>
+                </a:solidFill>
+              </a:rPr>
+              <a:t>+ </a:t>
+            </a:r>
+            <a:r>
+              <a:rPr lang="en-US" sz="900" dirty="0" err="1">
+                <a:solidFill>
+                  <a:prstClr val="black"/>
+                </a:solidFill>
+              </a:rPr>
+              <a:t>LoadStock</a:t>
+            </a:r>
+            <a:r>
+              <a:rPr lang="en-US" sz="900" dirty="0">
+                <a:solidFill>
+                  <a:prstClr val="black"/>
+                </a:solidFill>
+              </a:rPr>
+              <a:t>()</a:t>
+            </a:r>
+          </a:p>
+          <a:p>
+            <a:pPr defTabSz="872733"/>
+            <a:r>
+              <a:rPr lang="en-US" sz="900" dirty="0">
+                <a:solidFill>
+                  <a:prstClr val="black"/>
+                </a:solidFill>
+              </a:rPr>
+              <a:t>+ </a:t>
+            </a:r>
+            <a:r>
+              <a:rPr lang="en-US" sz="900" dirty="0" err="1">
+                <a:solidFill>
+                  <a:prstClr val="black"/>
+                </a:solidFill>
+              </a:rPr>
+              <a:t>LoadStock</a:t>
+            </a:r>
+            <a:r>
+              <a:rPr lang="en-US" sz="900" dirty="0">
+                <a:solidFill>
+                  <a:prstClr val="black"/>
+                </a:solidFill>
+              </a:rPr>
+              <a:t>(</a:t>
+            </a:r>
+            <a:r>
+              <a:rPr lang="en-US" sz="900" dirty="0" err="1">
+                <a:solidFill>
+                  <a:prstClr val="black"/>
+                </a:solidFill>
+              </a:rPr>
+              <a:t>filePath</a:t>
+            </a:r>
+            <a:r>
+              <a:rPr lang="en-US" sz="900" dirty="0">
+                <a:solidFill>
+                  <a:prstClr val="black"/>
+                </a:solidFill>
+              </a:rPr>
+              <a:t>: Stock)</a:t>
+            </a:r>
+          </a:p>
+          <a:p>
+            <a:pPr defTabSz="872733"/>
+            <a:r>
+              <a:rPr lang="en-US" sz="900" dirty="0">
+                <a:solidFill>
+                  <a:prstClr val="black"/>
+                </a:solidFill>
+              </a:rPr>
+              <a:t>+ </a:t>
+            </a:r>
+            <a:r>
+              <a:rPr lang="en-US" sz="900" dirty="0" err="1">
+                <a:solidFill>
+                  <a:prstClr val="black"/>
+                </a:solidFill>
+              </a:rPr>
+              <a:t>loadStockData</a:t>
+            </a:r>
+            <a:r>
+              <a:rPr lang="en-US" sz="900" dirty="0">
+                <a:solidFill>
+                  <a:prstClr val="black"/>
+                </a:solidFill>
+              </a:rPr>
+              <a:t>(stock: Stock)</a:t>
+            </a:r>
+          </a:p>
+          <a:p>
+            <a:pPr defTabSz="872733"/>
+            <a:r>
+              <a:rPr lang="en-US" sz="900" dirty="0">
+                <a:solidFill>
+                  <a:prstClr val="black"/>
+                </a:solidFill>
+              </a:rPr>
+              <a:t>- </a:t>
+            </a:r>
+            <a:r>
+              <a:rPr lang="en-US" sz="900" dirty="0" err="1">
+                <a:solidFill>
+                  <a:prstClr val="black"/>
+                </a:solidFill>
+              </a:rPr>
+              <a:t>decodeIngredientFromTextFile</a:t>
+            </a:r>
+            <a:r>
+              <a:rPr lang="en-US" sz="900" dirty="0">
+                <a:solidFill>
+                  <a:prstClr val="black"/>
+                </a:solidFill>
+              </a:rPr>
+              <a:t>(</a:t>
+            </a:r>
+          </a:p>
+          <a:p>
+            <a:pPr defTabSz="872733"/>
+            <a:r>
+              <a:rPr lang="en-US" sz="900" dirty="0">
+                <a:solidFill>
+                  <a:prstClr val="black"/>
+                </a:solidFill>
+              </a:rPr>
+              <a:t>lines: List&lt;String&gt;, </a:t>
+            </a:r>
+            <a:r>
+              <a:rPr lang="en-US" sz="900" dirty="0" err="1">
+                <a:solidFill>
+                  <a:prstClr val="black"/>
+                </a:solidFill>
+              </a:rPr>
+              <a:t>stock:Stock</a:t>
+            </a:r>
+            <a:r>
+              <a:rPr lang="en-US" sz="900" dirty="0">
+                <a:solidFill>
+                  <a:prstClr val="black"/>
+                </a:solidFill>
+              </a:rPr>
+              <a:t>)</a:t>
+            </a:r>
+          </a:p>
+          <a:p>
+            <a:pPr defTabSz="872733"/>
+            <a:r>
+              <a:rPr lang="en-US" sz="900" dirty="0">
+                <a:solidFill>
+                  <a:prstClr val="black"/>
+                </a:solidFill>
+              </a:rPr>
+              <a:t>- </a:t>
+            </a:r>
+            <a:r>
+              <a:rPr lang="en-US" sz="900" dirty="0" err="1">
+                <a:solidFill>
+                  <a:prstClr val="black"/>
+                </a:solidFill>
+              </a:rPr>
+              <a:t>decodeIngredientName</a:t>
+            </a:r>
+            <a:r>
+              <a:rPr lang="en-US" sz="900" dirty="0">
+                <a:solidFill>
+                  <a:prstClr val="black"/>
+                </a:solidFill>
+              </a:rPr>
+              <a:t>(</a:t>
+            </a:r>
+          </a:p>
+          <a:p>
+            <a:pPr defTabSz="872733"/>
+            <a:r>
+              <a:rPr lang="en-US" sz="900" dirty="0">
+                <a:solidFill>
+                  <a:prstClr val="black"/>
+                </a:solidFill>
+              </a:rPr>
+              <a:t>line: String, </a:t>
+            </a:r>
+            <a:r>
+              <a:rPr lang="en-US" sz="900" dirty="0" err="1">
+                <a:solidFill>
+                  <a:prstClr val="black"/>
+                </a:solidFill>
+              </a:rPr>
+              <a:t>priceIndexInLineArgs</a:t>
+            </a:r>
+            <a:r>
+              <a:rPr lang="en-US" sz="900" dirty="0">
+                <a:solidFill>
+                  <a:prstClr val="black"/>
+                </a:solidFill>
+              </a:rPr>
+              <a:t>: Integer)</a:t>
+            </a:r>
+          </a:p>
+          <a:p>
+            <a:pPr defTabSz="872733"/>
+            <a:r>
+              <a:rPr lang="en-US" sz="900" dirty="0">
+                <a:solidFill>
+                  <a:prstClr val="black"/>
+                </a:solidFill>
+              </a:rPr>
+              <a:t>- </a:t>
+            </a:r>
+            <a:r>
+              <a:rPr lang="en-US" sz="900" dirty="0" err="1">
+                <a:solidFill>
+                  <a:prstClr val="black"/>
+                </a:solidFill>
+              </a:rPr>
+              <a:t>decodeIngredientPrice</a:t>
+            </a:r>
+            <a:r>
+              <a:rPr lang="en-US" sz="900" dirty="0">
+                <a:solidFill>
+                  <a:prstClr val="black"/>
+                </a:solidFill>
+              </a:rPr>
+              <a:t>(</a:t>
+            </a:r>
+          </a:p>
+          <a:p>
+            <a:pPr defTabSz="872733"/>
+            <a:r>
+              <a:rPr lang="en-US" sz="900" dirty="0">
+                <a:solidFill>
+                  <a:prstClr val="black"/>
+                </a:solidFill>
+              </a:rPr>
+              <a:t>line: String, </a:t>
+            </a:r>
+            <a:r>
+              <a:rPr lang="en-US" sz="900" dirty="0" err="1">
+                <a:solidFill>
+                  <a:prstClr val="black"/>
+                </a:solidFill>
+              </a:rPr>
+              <a:t>priceIndexInLineArgs</a:t>
+            </a:r>
+            <a:r>
+              <a:rPr lang="en-US" sz="900" dirty="0">
+                <a:solidFill>
+                  <a:prstClr val="black"/>
+                </a:solidFill>
+              </a:rPr>
+              <a:t>: Integer)</a:t>
+            </a:r>
+          </a:p>
+          <a:p>
+            <a:pPr defTabSz="872733"/>
+            <a:r>
+              <a:rPr lang="en-US" sz="900" dirty="0">
+                <a:solidFill>
+                  <a:prstClr val="black"/>
+                </a:solidFill>
+              </a:rPr>
+              <a:t>- </a:t>
+            </a:r>
+            <a:r>
+              <a:rPr lang="en-US" sz="900" dirty="0" err="1">
+                <a:solidFill>
+                  <a:prstClr val="black"/>
+                </a:solidFill>
+              </a:rPr>
+              <a:t>decodeIngredientQuantity</a:t>
+            </a:r>
+            <a:r>
+              <a:rPr lang="en-US" sz="900" dirty="0">
+                <a:solidFill>
+                  <a:prstClr val="black"/>
+                </a:solidFill>
+              </a:rPr>
+              <a:t>(</a:t>
+            </a:r>
+          </a:p>
+          <a:p>
+            <a:pPr defTabSz="872733"/>
+            <a:r>
+              <a:rPr lang="en-US" sz="900" dirty="0">
+                <a:solidFill>
+                  <a:prstClr val="black"/>
+                </a:solidFill>
+              </a:rPr>
+              <a:t>line: String, </a:t>
+            </a:r>
+            <a:r>
+              <a:rPr lang="en-US" sz="900" dirty="0" err="1">
+                <a:solidFill>
+                  <a:prstClr val="black"/>
+                </a:solidFill>
+              </a:rPr>
+              <a:t>quantityIndexInLineArgs</a:t>
+            </a:r>
+            <a:r>
+              <a:rPr lang="en-US" sz="900" dirty="0">
+                <a:solidFill>
+                  <a:prstClr val="black"/>
+                </a:solidFill>
+              </a:rPr>
+              <a:t>: Integer)</a:t>
+            </a:r>
+          </a:p>
+          <a:p>
+            <a:pPr defTabSz="872733"/>
+            <a:r>
+              <a:rPr lang="en-US" sz="900" dirty="0">
+                <a:solidFill>
+                  <a:prstClr val="black"/>
+                </a:solidFill>
+              </a:rPr>
+              <a:t>+ </a:t>
+            </a:r>
+            <a:r>
+              <a:rPr lang="en-US" sz="900" dirty="0" err="1">
+                <a:solidFill>
+                  <a:prstClr val="black"/>
+                </a:solidFill>
+              </a:rPr>
+              <a:t>getFilePath</a:t>
+            </a:r>
+            <a:r>
+              <a:rPr lang="en-US" sz="900" dirty="0">
+                <a:solidFill>
+                  <a:prstClr val="black"/>
+                </a:solidFill>
+              </a:rPr>
+              <a:t>()</a:t>
+            </a:r>
+          </a:p>
+          <a:p>
+            <a:pPr defTabSz="872733"/>
+            <a:r>
+              <a:rPr lang="en-US" sz="900" dirty="0">
+                <a:solidFill>
+                  <a:prstClr val="black"/>
+                </a:solidFill>
+              </a:rPr>
+              <a:t>+ </a:t>
+            </a:r>
+            <a:r>
+              <a:rPr lang="en-US" sz="900" dirty="0" err="1">
+                <a:solidFill>
+                  <a:prstClr val="black"/>
+                </a:solidFill>
+              </a:rPr>
+              <a:t>isValidPath</a:t>
+            </a:r>
+            <a:r>
+              <a:rPr lang="en-US" sz="900" dirty="0">
+                <a:solidFill>
+                  <a:prstClr val="black"/>
+                </a:solidFill>
+              </a:rPr>
+              <a:t>(</a:t>
+            </a:r>
+            <a:r>
+              <a:rPr lang="en-US" sz="900" dirty="0" err="1">
+                <a:solidFill>
+                  <a:prstClr val="black"/>
+                </a:solidFill>
+              </a:rPr>
+              <a:t>filePath</a:t>
+            </a:r>
+            <a:r>
+              <a:rPr lang="en-US" sz="900" dirty="0">
+                <a:solidFill>
+                  <a:prstClr val="black"/>
+                </a:solidFill>
+              </a:rPr>
+              <a:t>: Path)</a:t>
+            </a:r>
+          </a:p>
+        </p:txBody>
+      </p:sp>
+      <p:sp>
+        <p:nvSpPr>
+          <p:cNvPr id="61" name="Diamond 60">
+            <a:extLst>
+              <a:ext uri="{FF2B5EF4-FFF2-40B4-BE49-F238E27FC236}">
+                <a16:creationId xmlns:a16="http://schemas.microsoft.com/office/drawing/2014/main" id="{FAC94536-8EC0-48D4-B737-B0EB1ACF5286}"/>
+              </a:ext>
+            </a:extLst>
+          </p:cNvPr>
+          <p:cNvSpPr/>
+          <p:nvPr/>
+        </p:nvSpPr>
+        <p:spPr>
+          <a:xfrm>
+            <a:off x="9206870" y="1918381"/>
+            <a:ext cx="171830" cy="215434"/>
+          </a:xfrm>
+          <a:prstGeom prst="diamond">
+            <a:avLst/>
+          </a:prstGeom>
+          <a:ln/>
+        </p:spPr>
+        <p:style>
+          <a:lnRef idx="2">
+            <a:schemeClr val="dk1">
+              <a:shade val="50000"/>
+            </a:schemeClr>
+          </a:lnRef>
+          <a:fillRef idx="1">
+            <a:schemeClr val="dk1"/>
+          </a:fillRef>
+          <a:effectRef idx="0">
+            <a:schemeClr val="dk1"/>
+          </a:effectRef>
+          <a:fontRef idx="minor">
+            <a:schemeClr val="lt1"/>
+          </a:fontRef>
+        </p:style>
+        <p:txBody>
+          <a:bodyPr rtlCol="0" anchor="ctr"/>
+          <a:lstStyle/>
+          <a:p>
+            <a:pPr algn="ctr"/>
+            <a:endParaRPr lang="en-SG"/>
+          </a:p>
+        </p:txBody>
+      </p:sp>
+      <p:cxnSp>
+        <p:nvCxnSpPr>
+          <p:cNvPr id="12" name="Connector: Elbow 11">
+            <a:extLst>
+              <a:ext uri="{FF2B5EF4-FFF2-40B4-BE49-F238E27FC236}">
+                <a16:creationId xmlns:a16="http://schemas.microsoft.com/office/drawing/2014/main" id="{78F6A302-746D-4966-AEC5-753BBD72B91A}"/>
+              </a:ext>
+            </a:extLst>
+          </p:cNvPr>
+          <p:cNvCxnSpPr>
+            <a:cxnSpLocks/>
+            <a:stCxn id="61" idx="0"/>
+            <a:endCxn id="56" idx="0"/>
+          </p:cNvCxnSpPr>
+          <p:nvPr/>
+        </p:nvCxnSpPr>
+        <p:spPr>
+          <a:xfrm rot="5400000" flipH="1" flipV="1">
+            <a:off x="9372857" y="613011"/>
+            <a:ext cx="1225298" cy="1385443"/>
+          </a:xfrm>
+          <a:prstGeom prst="bentConnector3">
+            <a:avLst>
+              <a:gd name="adj1" fmla="val 118657"/>
+            </a:avLst>
+          </a:prstGeom>
+        </p:spPr>
+        <p:style>
+          <a:lnRef idx="1">
+            <a:schemeClr val="accent1"/>
+          </a:lnRef>
+          <a:fillRef idx="0">
+            <a:schemeClr val="accent1"/>
+          </a:fillRef>
+          <a:effectRef idx="0">
+            <a:schemeClr val="accent1"/>
+          </a:effectRef>
+          <a:fontRef idx="minor">
+            <a:schemeClr val="tx1"/>
+          </a:fontRef>
+        </p:style>
+      </p:cxnSp>
+      <p:sp>
+        <p:nvSpPr>
+          <p:cNvPr id="62" name="TextBox 61">
+            <a:extLst>
+              <a:ext uri="{FF2B5EF4-FFF2-40B4-BE49-F238E27FC236}">
+                <a16:creationId xmlns:a16="http://schemas.microsoft.com/office/drawing/2014/main" id="{DCEF7E35-2289-4FEE-AA82-DE3C506DD7B7}"/>
+              </a:ext>
+            </a:extLst>
+          </p:cNvPr>
+          <p:cNvSpPr txBox="1"/>
+          <p:nvPr/>
+        </p:nvSpPr>
+        <p:spPr>
+          <a:xfrm>
+            <a:off x="10627387" y="402822"/>
+            <a:ext cx="1058554" cy="307777"/>
+          </a:xfrm>
+          <a:prstGeom prst="rect">
+            <a:avLst/>
+          </a:prstGeom>
+          <a:noFill/>
+        </p:spPr>
+        <p:txBody>
+          <a:bodyPr wrap="square" rtlCol="0">
+            <a:spAutoFit/>
+          </a:bodyPr>
+          <a:lstStyle/>
+          <a:p>
+            <a:r>
+              <a:rPr lang="en-SG" sz="1400" dirty="0" err="1">
+                <a:solidFill>
+                  <a:schemeClr val="bg1">
+                    <a:lumMod val="50000"/>
+                  </a:schemeClr>
+                </a:solidFill>
+              </a:rPr>
+              <a:t>stockLoader</a:t>
+            </a:r>
+            <a:endParaRPr lang="en-SG" sz="1400" dirty="0">
+              <a:solidFill>
+                <a:schemeClr val="bg1">
+                  <a:lumMod val="50000"/>
+                </a:schemeClr>
+              </a:solidFill>
+            </a:endParaRPr>
+          </a:p>
+        </p:txBody>
+      </p:sp>
+      <p:sp>
+        <p:nvSpPr>
+          <p:cNvPr id="63" name="TextBox 62">
+            <a:extLst>
+              <a:ext uri="{FF2B5EF4-FFF2-40B4-BE49-F238E27FC236}">
+                <a16:creationId xmlns:a16="http://schemas.microsoft.com/office/drawing/2014/main" id="{2D73888E-E9EE-4D95-9968-3F37C4CDF36C}"/>
+              </a:ext>
+            </a:extLst>
+          </p:cNvPr>
+          <p:cNvSpPr txBox="1"/>
+          <p:nvPr/>
+        </p:nvSpPr>
+        <p:spPr>
+          <a:xfrm>
+            <a:off x="10450202" y="420338"/>
+            <a:ext cx="609600" cy="307777"/>
+          </a:xfrm>
+          <a:prstGeom prst="rect">
+            <a:avLst/>
+          </a:prstGeom>
+          <a:noFill/>
+        </p:spPr>
+        <p:txBody>
+          <a:bodyPr wrap="square" rtlCol="0">
+            <a:spAutoFit/>
+          </a:bodyPr>
+          <a:lstStyle/>
+          <a:p>
+            <a:r>
+              <a:rPr lang="en-SG" sz="1400" dirty="0">
+                <a:solidFill>
+                  <a:schemeClr val="bg1">
+                    <a:lumMod val="50000"/>
+                  </a:schemeClr>
+                </a:solidFill>
+              </a:rPr>
+              <a:t>1</a:t>
+            </a:r>
           </a:p>
         </p:txBody>
       </p:sp>

</xml_diff>